<commit_message>
Update DESCRIZIONE SCHERMATE CON ESEMPIO GRAFICO.pptx
</commit_message>
<xml_diff>
--- a/SCHERMATE PRONTE/SCHERMATE PRONTE/STARTER_KIT_UI_AND_LOGIC/DESCRIZIONE SCHERMATE CON ESEMPIO GRAFICO.pptx
+++ b/SCHERMATE PRONTE/SCHERMATE PRONTE/STARTER_KIT_UI_AND_LOGIC/DESCRIZIONE SCHERMATE CON ESEMPIO GRAFICO.pptx
@@ -5,7 +5,7 @@
     <p:sldMasterId id="2147483648" r:id="rId1"/>
   </p:sldMasterIdLst>
   <p:notesMasterIdLst>
-    <p:notesMasterId r:id="rId12"/>
+    <p:notesMasterId r:id="rId13"/>
   </p:notesMasterIdLst>
   <p:sldIdLst>
     <p:sldId id="257" r:id="rId2"/>
@@ -18,6 +18,7 @@
     <p:sldId id="260" r:id="rId9"/>
     <p:sldId id="261" r:id="rId10"/>
     <p:sldId id="263" r:id="rId11"/>
+    <p:sldId id="268" r:id="rId12"/>
   </p:sldIdLst>
   <p:sldSz cx="12192000" cy="6858000"/>
   <p:notesSz cx="6858000" cy="9144000"/>
@@ -139,12 +140,29 @@
 <p1510:revInfo xmlns:a="http://schemas.openxmlformats.org/drawingml/2006/main" xmlns:r="http://schemas.openxmlformats.org/officeDocument/2006/relationships" xmlns:p1510="http://schemas.microsoft.com/office/powerpoint/2015/10/main">
   <p1510:revLst>
     <p1510:client id="{50DED8A2-2776-4FE5-ADA8-A18F2C07F4F3}" v="71" dt="2025-07-04T18:46:53.369"/>
+    <p1510:client id="{72986D0E-7BBF-404C-AD0A-B5F5A5E3C115}" v="1" dt="2025-07-05T08:57:22.714"/>
   </p1510:revLst>
 </p1510:revInfo>
 </file>
 
 <file path=ppt/changesInfos/changesInfo1.xml><?xml version="1.0" encoding="utf-8"?>
 <pc:chgInfo xmlns:a="http://schemas.openxmlformats.org/drawingml/2006/main" xmlns:r="http://schemas.openxmlformats.org/officeDocument/2006/relationships" xmlns:ac="http://schemas.microsoft.com/office/drawing/2013/main/command" xmlns:pc="http://schemas.microsoft.com/office/powerpoint/2013/main/command">
+  <pc:docChgLst>
+    <pc:chgData name="Giorgio Ferrari" userId="d08cc0a3825265f1" providerId="LiveId" clId="{72986D0E-7BBF-404C-AD0A-B5F5A5E3C115}"/>
+    <pc:docChg chg="addSld modSld">
+      <pc:chgData name="Giorgio Ferrari" userId="d08cc0a3825265f1" providerId="LiveId" clId="{72986D0E-7BBF-404C-AD0A-B5F5A5E3C115}" dt="2025-07-05T08:57:22.710" v="0"/>
+      <pc:docMkLst>
+        <pc:docMk/>
+      </pc:docMkLst>
+      <pc:sldChg chg="add">
+        <pc:chgData name="Giorgio Ferrari" userId="d08cc0a3825265f1" providerId="LiveId" clId="{72986D0E-7BBF-404C-AD0A-B5F5A5E3C115}" dt="2025-07-05T08:57:22.710" v="0"/>
+        <pc:sldMkLst>
+          <pc:docMk/>
+          <pc:sldMk cId="1859182865" sldId="268"/>
+        </pc:sldMkLst>
+      </pc:sldChg>
+    </pc:docChg>
+  </pc:docChgLst>
   <pc:docChgLst>
     <pc:chgData name="Ferrari, Giorgio  /IT" userId="d6c707c9-f075-4623-a23b-16c59040d974" providerId="ADAL" clId="{50DED8A2-2776-4FE5-ADA8-A18F2C07F4F3}"/>
     <pc:docChg chg="undo custSel addSld delSld modSld">
@@ -1414,7 +1432,7 @@
           <a:p>
             <a:fld id="{5C731237-B017-4CDC-8853-C46CC07EE009}" type="datetimeFigureOut">
               <a:rPr lang="it-IT" smtClean="0"/>
-              <a:t>04/07/2025</a:t>
+              <a:t>05/07/2025</a:t>
             </a:fld>
             <a:endParaRPr lang="it-IT"/>
           </a:p>
@@ -2215,6 +2233,307 @@
 </p:notes>
 </file>
 
+<file path=ppt/notesSlides/notesSlide11.xml><?xml version="1.0" encoding="utf-8"?>
+<p:notes xmlns:a="http://schemas.openxmlformats.org/drawingml/2006/main" xmlns:r="http://schemas.openxmlformats.org/officeDocument/2006/relationships" xmlns:p="http://schemas.openxmlformats.org/presentationml/2006/main">
+  <p:cSld>
+    <p:spTree>
+      <p:nvGrpSpPr>
+        <p:cNvPr id="1" name=""/>
+        <p:cNvGrpSpPr/>
+        <p:nvPr/>
+      </p:nvGrpSpPr>
+      <p:grpSpPr>
+        <a:xfrm>
+          <a:off x="0" y="0"/>
+          <a:ext cx="0" cy="0"/>
+          <a:chOff x="0" y="0"/>
+          <a:chExt cx="0" cy="0"/>
+        </a:xfrm>
+      </p:grpSpPr>
+      <p:sp>
+        <p:nvSpPr>
+          <p:cNvPr id="2" name="Segnaposto immagine diapositiva 1"/>
+          <p:cNvSpPr>
+            <a:spLocks noGrp="1" noRot="1" noChangeAspect="1"/>
+          </p:cNvSpPr>
+          <p:nvPr>
+            <p:ph type="sldImg"/>
+          </p:nvPr>
+        </p:nvSpPr>
+        <p:spPr/>
+      </p:sp>
+      <p:sp>
+        <p:nvSpPr>
+          <p:cNvPr id="3" name="Segnaposto note 2"/>
+          <p:cNvSpPr>
+            <a:spLocks noGrp="1"/>
+          </p:cNvSpPr>
+          <p:nvPr>
+            <p:ph type="body" idx="1"/>
+          </p:nvPr>
+        </p:nvSpPr>
+        <p:spPr/>
+        <p:txBody>
+          <a:bodyPr/>
+          <a:lstStyle/>
+          <a:p>
+            <a:r>
+              <a:rPr lang="it-IT" dirty="0"/>
+              <a:t>Basandomi sullo stile delle descrizioni fornite nel documento, ecco la descrizione della schermata mostrata nell'immagine:</a:t>
+            </a:r>
+          </a:p>
+          <a:p>
+            <a:r>
+              <a:rPr lang="it-IT" b="1" dirty="0"/>
+              <a:t>SCHERMATA DI GIOCO PRINCIPALE CON TITOLO SEPARATO.</a:t>
+            </a:r>
+            <a:endParaRPr lang="it-IT" dirty="0"/>
+          </a:p>
+          <a:p>
+            <a:r>
+              <a:rPr lang="it-IT" dirty="0"/>
+              <a:t>C'è un contenitore padre globale che occupa tutta l'altezza e tutta la larghezza dello schermo, aderendo perfettamente ai bordi dello schermo, per garantire che su ogni risoluzione l'interfaccia venga contenuta interamente dentro una schermata senza mai uscire dai bordi.</a:t>
+            </a:r>
+          </a:p>
+          <a:p>
+            <a:r>
+              <a:rPr lang="it-IT" b="1" dirty="0"/>
+              <a:t>HEADER:</a:t>
+            </a:r>
+            <a:r>
+              <a:rPr lang="it-IT" dirty="0"/>
+              <a:t> La parte superiore sinistra è occupata da un box rettangolare dedicato al titolo della schermata. Il box occupa circa il 20% della larghezza della schermata e circa il 5% dell'altezza totale, lasciando uno spazio di circa 10 pixels esternamente su tutti e quattro i lati, per distanziarlo dai bordi dello schermo e dagli elementi sottostanti. Il contenuto testuale dell'</a:t>
+            </a:r>
+            <a:r>
+              <a:rPr lang="it-IT" dirty="0" err="1"/>
+              <a:t>header</a:t>
+            </a:r>
+            <a:r>
+              <a:rPr lang="it-IT" dirty="0"/>
+              <a:t> dice «TITOLO» e viene recuperato dinamicamente dal campo </a:t>
+            </a:r>
+            <a:r>
+              <a:rPr lang="it-IT" dirty="0" err="1"/>
+              <a:t>titolo_schermata</a:t>
+            </a:r>
+            <a:r>
+              <a:rPr lang="it-IT" dirty="0"/>
+              <a:t> del file di dati .</a:t>
+            </a:r>
+            <a:r>
+              <a:rPr lang="it-IT" dirty="0" err="1"/>
+              <a:t>json</a:t>
+            </a:r>
+            <a:r>
+              <a:rPr lang="it-IT" dirty="0"/>
+              <a:t> associato all'id corrispondente della schermata attualmente visualizzata.</a:t>
+            </a:r>
+          </a:p>
+          <a:p>
+            <a:r>
+              <a:rPr lang="it-IT" b="1" dirty="0"/>
+              <a:t>CORPO DELLA SCHERMATA:</a:t>
+            </a:r>
+            <a:r>
+              <a:rPr lang="it-IT" dirty="0"/>
+              <a:t> Il corpo della schermata è diviso in due colonne verticali affiancate. La colonna di SINISTRA occupa circa il 20% della larghezza complessiva della schermata ed è suddivisa in tre sezioni verticali.</a:t>
+            </a:r>
+          </a:p>
+          <a:p>
+            <a:r>
+              <a:rPr lang="it-IT" dirty="0"/>
+              <a:t>La sezione superiore, posizionata sotto al box del titolo, contiene un riquadro rettangolare destinato ad accogliere la descrizione narrativa della situazione di gioco, recuperata in modo dinamico dal file di dati .</a:t>
+            </a:r>
+            <a:r>
+              <a:rPr lang="it-IT" dirty="0" err="1"/>
+              <a:t>json</a:t>
+            </a:r>
+            <a:r>
+              <a:rPr lang="it-IT" dirty="0"/>
+              <a:t> associato all'id corrispondente della schermata attualmente visualizzata. Questo box occupa circa il 60% in altezza della colonna sinistra ed è posizionato con un </a:t>
+            </a:r>
+            <a:r>
+              <a:rPr lang="it-IT" dirty="0" err="1"/>
+              <a:t>padding</a:t>
+            </a:r>
+            <a:r>
+              <a:rPr lang="it-IT" dirty="0"/>
+              <a:t> di 10 pixels su tutti e quattro i lati. Il box della narrativa diventa scrollabile verticalmente se il testo supera le dimensioni di contenimento del box.</a:t>
+            </a:r>
+          </a:p>
+          <a:p>
+            <a:r>
+              <a:rPr lang="it-IT" dirty="0"/>
+              <a:t>Sotto al riquadro narrativo è presente un box contenitore tratteggiato che occupa il restante 30% della colonna sinistra. All'interno di questo contenitore ci sono 2 pulsanti rettangolari allineati verticalmente e equidistanti fra di loro:</a:t>
+            </a:r>
+          </a:p>
+          <a:p>
+            <a:r>
+              <a:rPr lang="it-IT" dirty="0"/>
+              <a:t>Il pulsante1 è il primo in alto e contiene il testo recuperato dinamicamente dal campo testo_pulsante1 del file .</a:t>
+            </a:r>
+            <a:r>
+              <a:rPr lang="it-IT" dirty="0" err="1"/>
+              <a:t>json</a:t>
+            </a:r>
+            <a:r>
+              <a:rPr lang="it-IT" dirty="0"/>
+              <a:t> associato</a:t>
+            </a:r>
+          </a:p>
+          <a:p>
+            <a:r>
+              <a:rPr lang="it-IT" dirty="0"/>
+              <a:t>Il pulsante2 è il secondo a partire dall'alto e contiene il testo recuperato dinamicamente dal campo testo_pulsante2 del file .</a:t>
+            </a:r>
+            <a:r>
+              <a:rPr lang="it-IT" dirty="0" err="1"/>
+              <a:t>json</a:t>
+            </a:r>
+            <a:r>
+              <a:rPr lang="it-IT" dirty="0"/>
+              <a:t> associato</a:t>
+            </a:r>
+          </a:p>
+          <a:p>
+            <a:r>
+              <a:rPr lang="it-IT" dirty="0"/>
+              <a:t>Nella colonna di DESTRA, che occupa circa il 80% della larghezza complessiva della schermata, è posizionato un riquadro in formato 16:9 destinato ad accogliere una immagine della scena, che verrà presa dal percorso indicato nel campo </a:t>
+            </a:r>
+            <a:r>
+              <a:rPr lang="it-IT" dirty="0" err="1"/>
+              <a:t>path_immagine</a:t>
+            </a:r>
+            <a:r>
+              <a:rPr lang="it-IT" dirty="0"/>
+              <a:t> del file .</a:t>
+            </a:r>
+            <a:r>
+              <a:rPr lang="it-IT" dirty="0" err="1"/>
+              <a:t>json</a:t>
+            </a:r>
+            <a:r>
+              <a:rPr lang="it-IT" dirty="0"/>
+              <a:t> associato all'id corrispondente della schermata attualmente visualizzata. Questo riquadro è allineato superiormente con il box della narrativa nella colonna sinistra e occupa circa l'80% in altezza della schermata, presentando uno spazio esterno di </a:t>
+            </a:r>
+            <a:r>
+              <a:rPr lang="it-IT" dirty="0" err="1"/>
+              <a:t>padding</a:t>
+            </a:r>
+            <a:r>
+              <a:rPr lang="it-IT" dirty="0"/>
+              <a:t> di 10 pixels su tutti e quattro i lati.</a:t>
+            </a:r>
+          </a:p>
+          <a:p>
+            <a:r>
+              <a:rPr lang="it-IT" dirty="0"/>
+              <a:t>Sotto al riquadro dell'immagine è presente un box contenitore largo esattamente come il box dell'immagine. Il bordo inferiore del contenitore è allineato con il bordo inferiore dello schermo e con il bordo inferiore del contenitore dei pulsanti nella colonna sinistra. All'interno di questo contenitore ci sono 4 pulsanti rettangolari equidistanti fra di loro, posizionati orizzontalmente:</a:t>
+            </a:r>
+          </a:p>
+          <a:p>
+            <a:r>
+              <a:rPr lang="it-IT" dirty="0"/>
+              <a:t>Il pulsante_menu1 contiene il testo "PERSONAGGIO"</a:t>
+            </a:r>
+          </a:p>
+          <a:p>
+            <a:r>
+              <a:rPr lang="it-IT" dirty="0"/>
+              <a:t>Il pulsante_menu2 contiene il testo "INFLUENZA"</a:t>
+            </a:r>
+          </a:p>
+          <a:p>
+            <a:r>
+              <a:rPr lang="it-IT" dirty="0"/>
+              <a:t>Il pulsante_menu3 contiene il testo "HOME"</a:t>
+            </a:r>
+          </a:p>
+          <a:p>
+            <a:r>
+              <a:rPr lang="it-IT" dirty="0"/>
+              <a:t>Il pulsante_menu4 contiene il testo "OPZIONI"</a:t>
+            </a:r>
+          </a:p>
+          <a:p>
+            <a:r>
+              <a:rPr lang="it-IT" b="1" dirty="0"/>
+              <a:t>SFONDO:</a:t>
+            </a:r>
+            <a:r>
+              <a:rPr lang="it-IT" dirty="0"/>
+              <a:t> Lo sfondo presenta un effetto animato molto semplice e coerente con il tema generale del gioco.</a:t>
+            </a:r>
+          </a:p>
+          <a:p>
+            <a:r>
+              <a:rPr lang="it-IT" b="1" dirty="0"/>
+              <a:t>STILE:</a:t>
+            </a:r>
+            <a:r>
+              <a:rPr lang="it-IT" dirty="0"/>
+              <a:t> L'intero stile della schermata deve essere coerente con lo stile globale del gioco in cui viene utilizzata.</a:t>
+            </a:r>
+          </a:p>
+          <a:p>
+            <a:r>
+              <a:rPr lang="it-IT" b="1" dirty="0"/>
+              <a:t>LOGICA DELLA SCHERMATA:</a:t>
+            </a:r>
+            <a:r>
+              <a:rPr lang="it-IT" dirty="0"/>
+              <a:t> La schermata rappresenta l'interfaccia principale di gioco dove il giocatore può visualizzare il titolo della sezione corrente, leggere la narrativa della storia, vedere l'immagine della scena attuale, interagire con le opzioni di gioco tramite i pulsanti laterali e navigare attraverso i menu principali tramite i pulsanti inferiori. Tutti i contenuti testuali e le immagini vengono caricati dinamicamente dal file .</a:t>
+            </a:r>
+            <a:r>
+              <a:rPr lang="it-IT" dirty="0" err="1"/>
+              <a:t>json</a:t>
+            </a:r>
+            <a:r>
+              <a:rPr lang="it-IT" dirty="0"/>
+              <a:t> associato all'id della schermata corrente.</a:t>
+            </a:r>
+          </a:p>
+          <a:p>
+            <a:endParaRPr lang="it-IT" dirty="0"/>
+          </a:p>
+        </p:txBody>
+      </p:sp>
+      <p:sp>
+        <p:nvSpPr>
+          <p:cNvPr id="4" name="Segnaposto numero diapositiva 3"/>
+          <p:cNvSpPr>
+            <a:spLocks noGrp="1"/>
+          </p:cNvSpPr>
+          <p:nvPr>
+            <p:ph type="sldNum" sz="quarter" idx="5"/>
+          </p:nvPr>
+        </p:nvSpPr>
+        <p:spPr/>
+        <p:txBody>
+          <a:bodyPr/>
+          <a:lstStyle/>
+          <a:p>
+            <a:fld id="{E6E1E249-A6BD-4189-9665-0A39BFEF32D7}" type="slidenum">
+              <a:rPr lang="it-IT" smtClean="0"/>
+              <a:t>11</a:t>
+            </a:fld>
+            <a:endParaRPr lang="it-IT"/>
+          </a:p>
+        </p:txBody>
+      </p:sp>
+    </p:spTree>
+    <p:extLst>
+      <p:ext uri="{BB962C8B-B14F-4D97-AF65-F5344CB8AC3E}">
+        <p14:creationId xmlns:p14="http://schemas.microsoft.com/office/powerpoint/2010/main" val="620224003"/>
+      </p:ext>
+    </p:extLst>
+  </p:cSld>
+  <p:clrMapOvr>
+    <a:masterClrMapping/>
+  </p:clrMapOvr>
+</p:notes>
+</file>
+
 <file path=ppt/notesSlides/notesSlide2.xml><?xml version="1.0" encoding="utf-8"?>
 <p:notes xmlns:a="http://schemas.openxmlformats.org/drawingml/2006/main" xmlns:r="http://schemas.openxmlformats.org/officeDocument/2006/relationships" xmlns:p="http://schemas.openxmlformats.org/presentationml/2006/main">
   <p:cSld>
@@ -4966,7 +5285,7 @@
           <a:p>
             <a:fld id="{A45F5502-8172-4F75-8020-F91E48428282}" type="datetimeFigureOut">
               <a:rPr lang="it-IT" smtClean="0"/>
-              <a:t>04/07/2025</a:t>
+              <a:t>05/07/2025</a:t>
             </a:fld>
             <a:endParaRPr lang="it-IT"/>
           </a:p>
@@ -5164,7 +5483,7 @@
           <a:p>
             <a:fld id="{A45F5502-8172-4F75-8020-F91E48428282}" type="datetimeFigureOut">
               <a:rPr lang="it-IT" smtClean="0"/>
-              <a:t>04/07/2025</a:t>
+              <a:t>05/07/2025</a:t>
             </a:fld>
             <a:endParaRPr lang="it-IT"/>
           </a:p>
@@ -5372,7 +5691,7 @@
           <a:p>
             <a:fld id="{A45F5502-8172-4F75-8020-F91E48428282}" type="datetimeFigureOut">
               <a:rPr lang="it-IT" smtClean="0"/>
-              <a:t>04/07/2025</a:t>
+              <a:t>05/07/2025</a:t>
             </a:fld>
             <a:endParaRPr lang="it-IT"/>
           </a:p>
@@ -5570,7 +5889,7 @@
           <a:p>
             <a:fld id="{A45F5502-8172-4F75-8020-F91E48428282}" type="datetimeFigureOut">
               <a:rPr lang="it-IT" smtClean="0"/>
-              <a:t>04/07/2025</a:t>
+              <a:t>05/07/2025</a:t>
             </a:fld>
             <a:endParaRPr lang="it-IT"/>
           </a:p>
@@ -5845,7 +6164,7 @@
           <a:p>
             <a:fld id="{A45F5502-8172-4F75-8020-F91E48428282}" type="datetimeFigureOut">
               <a:rPr lang="it-IT" smtClean="0"/>
-              <a:t>04/07/2025</a:t>
+              <a:t>05/07/2025</a:t>
             </a:fld>
             <a:endParaRPr lang="it-IT"/>
           </a:p>
@@ -6110,7 +6429,7 @@
           <a:p>
             <a:fld id="{A45F5502-8172-4F75-8020-F91E48428282}" type="datetimeFigureOut">
               <a:rPr lang="it-IT" smtClean="0"/>
-              <a:t>04/07/2025</a:t>
+              <a:t>05/07/2025</a:t>
             </a:fld>
             <a:endParaRPr lang="it-IT"/>
           </a:p>
@@ -6522,7 +6841,7 @@
           <a:p>
             <a:fld id="{A45F5502-8172-4F75-8020-F91E48428282}" type="datetimeFigureOut">
               <a:rPr lang="it-IT" smtClean="0"/>
-              <a:t>04/07/2025</a:t>
+              <a:t>05/07/2025</a:t>
             </a:fld>
             <a:endParaRPr lang="it-IT"/>
           </a:p>
@@ -6663,7 +6982,7 @@
           <a:p>
             <a:fld id="{A45F5502-8172-4F75-8020-F91E48428282}" type="datetimeFigureOut">
               <a:rPr lang="it-IT" smtClean="0"/>
-              <a:t>04/07/2025</a:t>
+              <a:t>05/07/2025</a:t>
             </a:fld>
             <a:endParaRPr lang="it-IT"/>
           </a:p>
@@ -6776,7 +7095,7 @@
           <a:p>
             <a:fld id="{A45F5502-8172-4F75-8020-F91E48428282}" type="datetimeFigureOut">
               <a:rPr lang="it-IT" smtClean="0"/>
-              <a:t>04/07/2025</a:t>
+              <a:t>05/07/2025</a:t>
             </a:fld>
             <a:endParaRPr lang="it-IT"/>
           </a:p>
@@ -7087,7 +7406,7 @@
           <a:p>
             <a:fld id="{A45F5502-8172-4F75-8020-F91E48428282}" type="datetimeFigureOut">
               <a:rPr lang="it-IT" smtClean="0"/>
-              <a:t>04/07/2025</a:t>
+              <a:t>05/07/2025</a:t>
             </a:fld>
             <a:endParaRPr lang="it-IT"/>
           </a:p>
@@ -7375,7 +7694,7 @@
           <a:p>
             <a:fld id="{A45F5502-8172-4F75-8020-F91E48428282}" type="datetimeFigureOut">
               <a:rPr lang="it-IT" smtClean="0"/>
-              <a:t>04/07/2025</a:t>
+              <a:t>05/07/2025</a:t>
             </a:fld>
             <a:endParaRPr lang="it-IT"/>
           </a:p>
@@ -7616,7 +7935,7 @@
           <a:p>
             <a:fld id="{A45F5502-8172-4F75-8020-F91E48428282}" type="datetimeFigureOut">
               <a:rPr lang="it-IT" smtClean="0"/>
-              <a:t>04/07/2025</a:t>
+              <a:t>05/07/2025</a:t>
             </a:fld>
             <a:endParaRPr lang="it-IT"/>
           </a:p>
@@ -9427,6 +9746,586 @@
     <p:extLst>
       <p:ext uri="{BB962C8B-B14F-4D97-AF65-F5344CB8AC3E}">
         <p14:creationId xmlns:p14="http://schemas.microsoft.com/office/powerpoint/2010/main" val="3190868717"/>
+      </p:ext>
+    </p:extLst>
+  </p:cSld>
+  <p:clrMapOvr>
+    <a:masterClrMapping/>
+  </p:clrMapOvr>
+</p:sld>
+</file>
+
+<file path=ppt/slides/slide11.xml><?xml version="1.0" encoding="utf-8"?>
+<p:sld xmlns:a="http://schemas.openxmlformats.org/drawingml/2006/main" xmlns:r="http://schemas.openxmlformats.org/officeDocument/2006/relationships" xmlns:p="http://schemas.openxmlformats.org/presentationml/2006/main">
+  <p:cSld>
+    <p:spTree>
+      <p:nvGrpSpPr>
+        <p:cNvPr id="1" name=""/>
+        <p:cNvGrpSpPr/>
+        <p:nvPr/>
+      </p:nvGrpSpPr>
+      <p:grpSpPr>
+        <a:xfrm>
+          <a:off x="0" y="0"/>
+          <a:ext cx="0" cy="0"/>
+          <a:chOff x="0" y="0"/>
+          <a:chExt cx="0" cy="0"/>
+        </a:xfrm>
+      </p:grpSpPr>
+      <p:sp>
+        <p:nvSpPr>
+          <p:cNvPr id="2" name="Rettangolo 1">
+            <a:extLst>
+              <a:ext uri="{FF2B5EF4-FFF2-40B4-BE49-F238E27FC236}">
+                <a16:creationId xmlns:a16="http://schemas.microsoft.com/office/drawing/2014/main" id="{B936516C-6505-C955-3C81-441665602834}"/>
+              </a:ext>
+            </a:extLst>
+          </p:cNvPr>
+          <p:cNvSpPr/>
+          <p:nvPr/>
+        </p:nvSpPr>
+        <p:spPr>
+          <a:xfrm>
+            <a:off x="3519577" y="207034"/>
+            <a:ext cx="8505646" cy="5572664"/>
+          </a:xfrm>
+          <a:prstGeom prst="rect">
+            <a:avLst/>
+          </a:prstGeom>
+        </p:spPr>
+        <p:style>
+          <a:lnRef idx="2">
+            <a:schemeClr val="accent6"/>
+          </a:lnRef>
+          <a:fillRef idx="1">
+            <a:schemeClr val="lt1"/>
+          </a:fillRef>
+          <a:effectRef idx="0">
+            <a:schemeClr val="accent6"/>
+          </a:effectRef>
+          <a:fontRef idx="minor">
+            <a:schemeClr val="dk1"/>
+          </a:fontRef>
+        </p:style>
+        <p:txBody>
+          <a:bodyPr rtlCol="0" anchor="ctr"/>
+          <a:lstStyle/>
+          <a:p>
+            <a:pPr algn="ctr"/>
+            <a:r>
+              <a:rPr lang="it-IT" dirty="0"/>
+              <a:t>Qui inserisci una immagine in 16:9 della scena </a:t>
+            </a:r>
+          </a:p>
+        </p:txBody>
+      </p:sp>
+      <p:sp>
+        <p:nvSpPr>
+          <p:cNvPr id="3" name="Rettangolo 2">
+            <a:extLst>
+              <a:ext uri="{FF2B5EF4-FFF2-40B4-BE49-F238E27FC236}">
+                <a16:creationId xmlns:a16="http://schemas.microsoft.com/office/drawing/2014/main" id="{1EC8C44A-BE4B-C126-22C3-F0875C98CBFD}"/>
+              </a:ext>
+            </a:extLst>
+          </p:cNvPr>
+          <p:cNvSpPr/>
+          <p:nvPr/>
+        </p:nvSpPr>
+        <p:spPr>
+          <a:xfrm>
+            <a:off x="241541" y="726020"/>
+            <a:ext cx="3122762" cy="3502324"/>
+          </a:xfrm>
+          <a:prstGeom prst="rect">
+            <a:avLst/>
+          </a:prstGeom>
+        </p:spPr>
+        <p:style>
+          <a:lnRef idx="2">
+            <a:schemeClr val="accent1">
+              <a:shade val="15000"/>
+            </a:schemeClr>
+          </a:lnRef>
+          <a:fillRef idx="1">
+            <a:schemeClr val="accent1"/>
+          </a:fillRef>
+          <a:effectRef idx="0">
+            <a:schemeClr val="accent1"/>
+          </a:effectRef>
+          <a:fontRef idx="minor">
+            <a:schemeClr val="lt1"/>
+          </a:fontRef>
+        </p:style>
+        <p:txBody>
+          <a:bodyPr rtlCol="0" anchor="ctr"/>
+          <a:lstStyle/>
+          <a:p>
+            <a:pPr algn="ctr"/>
+            <a:r>
+              <a:rPr lang="it-IT" dirty="0"/>
+              <a:t>Qui inserisci la narrativa</a:t>
+            </a:r>
+          </a:p>
+        </p:txBody>
+      </p:sp>
+      <p:sp>
+        <p:nvSpPr>
+          <p:cNvPr id="4" name="Rettangolo 3">
+            <a:extLst>
+              <a:ext uri="{FF2B5EF4-FFF2-40B4-BE49-F238E27FC236}">
+                <a16:creationId xmlns:a16="http://schemas.microsoft.com/office/drawing/2014/main" id="{1682DD0E-BF78-DACA-2F97-82449A7B2126}"/>
+              </a:ext>
+            </a:extLst>
+          </p:cNvPr>
+          <p:cNvSpPr/>
+          <p:nvPr/>
+        </p:nvSpPr>
+        <p:spPr>
+          <a:xfrm>
+            <a:off x="241541" y="4386649"/>
+            <a:ext cx="3122762" cy="2264316"/>
+          </a:xfrm>
+          <a:prstGeom prst="rect">
+            <a:avLst/>
+          </a:prstGeom>
+          <a:noFill/>
+          <a:ln>
+            <a:solidFill>
+              <a:schemeClr val="tx1"/>
+            </a:solidFill>
+            <a:prstDash val="dash"/>
+          </a:ln>
+        </p:spPr>
+        <p:style>
+          <a:lnRef idx="2">
+            <a:schemeClr val="accent1">
+              <a:shade val="15000"/>
+            </a:schemeClr>
+          </a:lnRef>
+          <a:fillRef idx="1">
+            <a:schemeClr val="accent1"/>
+          </a:fillRef>
+          <a:effectRef idx="0">
+            <a:schemeClr val="accent1"/>
+          </a:effectRef>
+          <a:fontRef idx="minor">
+            <a:schemeClr val="lt1"/>
+          </a:fontRef>
+        </p:style>
+        <p:txBody>
+          <a:bodyPr rtlCol="0" anchor="ctr"/>
+          <a:lstStyle/>
+          <a:p>
+            <a:pPr algn="ctr"/>
+            <a:endParaRPr lang="it-IT"/>
+          </a:p>
+        </p:txBody>
+      </p:sp>
+      <p:sp>
+        <p:nvSpPr>
+          <p:cNvPr id="5" name="Rettangolo 4">
+            <a:extLst>
+              <a:ext uri="{FF2B5EF4-FFF2-40B4-BE49-F238E27FC236}">
+                <a16:creationId xmlns:a16="http://schemas.microsoft.com/office/drawing/2014/main" id="{2B02FD0C-BC88-EEF4-3500-562120556F97}"/>
+              </a:ext>
+            </a:extLst>
+          </p:cNvPr>
+          <p:cNvSpPr/>
+          <p:nvPr/>
+        </p:nvSpPr>
+        <p:spPr>
+          <a:xfrm>
+            <a:off x="431320" y="4526073"/>
+            <a:ext cx="2760454" cy="983413"/>
+          </a:xfrm>
+          <a:prstGeom prst="rect">
+            <a:avLst/>
+          </a:prstGeom>
+          <a:noFill/>
+          <a:ln>
+            <a:solidFill>
+              <a:schemeClr val="tx1"/>
+            </a:solidFill>
+          </a:ln>
+        </p:spPr>
+        <p:style>
+          <a:lnRef idx="2">
+            <a:schemeClr val="accent1">
+              <a:shade val="15000"/>
+            </a:schemeClr>
+          </a:lnRef>
+          <a:fillRef idx="1">
+            <a:schemeClr val="accent1"/>
+          </a:fillRef>
+          <a:effectRef idx="0">
+            <a:schemeClr val="accent1"/>
+          </a:effectRef>
+          <a:fontRef idx="minor">
+            <a:schemeClr val="lt1"/>
+          </a:fontRef>
+        </p:style>
+        <p:txBody>
+          <a:bodyPr rtlCol="0" anchor="ctr"/>
+          <a:lstStyle/>
+          <a:p>
+            <a:pPr algn="ctr"/>
+            <a:r>
+              <a:rPr lang="it-IT" dirty="0">
+                <a:solidFill>
+                  <a:schemeClr val="tx1"/>
+                </a:solidFill>
+              </a:rPr>
+              <a:t>Pulsante 1</a:t>
+            </a:r>
+          </a:p>
+        </p:txBody>
+      </p:sp>
+      <p:sp>
+        <p:nvSpPr>
+          <p:cNvPr id="6" name="Rettangolo 5">
+            <a:extLst>
+              <a:ext uri="{FF2B5EF4-FFF2-40B4-BE49-F238E27FC236}">
+                <a16:creationId xmlns:a16="http://schemas.microsoft.com/office/drawing/2014/main" id="{49045E10-1E1E-0414-96D2-E1E0635BFF22}"/>
+              </a:ext>
+            </a:extLst>
+          </p:cNvPr>
+          <p:cNvSpPr/>
+          <p:nvPr/>
+        </p:nvSpPr>
+        <p:spPr>
+          <a:xfrm>
+            <a:off x="431320" y="5575463"/>
+            <a:ext cx="2760454" cy="983413"/>
+          </a:xfrm>
+          <a:prstGeom prst="rect">
+            <a:avLst/>
+          </a:prstGeom>
+          <a:noFill/>
+          <a:ln>
+            <a:solidFill>
+              <a:schemeClr val="tx1"/>
+            </a:solidFill>
+          </a:ln>
+        </p:spPr>
+        <p:style>
+          <a:lnRef idx="2">
+            <a:schemeClr val="accent1">
+              <a:shade val="15000"/>
+            </a:schemeClr>
+          </a:lnRef>
+          <a:fillRef idx="1">
+            <a:schemeClr val="accent1"/>
+          </a:fillRef>
+          <a:effectRef idx="0">
+            <a:schemeClr val="accent1"/>
+          </a:effectRef>
+          <a:fontRef idx="minor">
+            <a:schemeClr val="lt1"/>
+          </a:fontRef>
+        </p:style>
+        <p:txBody>
+          <a:bodyPr rtlCol="0" anchor="ctr"/>
+          <a:lstStyle/>
+          <a:p>
+            <a:pPr algn="ctr"/>
+            <a:r>
+              <a:rPr lang="it-IT" dirty="0">
+                <a:solidFill>
+                  <a:schemeClr val="tx1"/>
+                </a:solidFill>
+              </a:rPr>
+              <a:t>Pulsante 2</a:t>
+            </a:r>
+          </a:p>
+        </p:txBody>
+      </p:sp>
+      <p:sp>
+        <p:nvSpPr>
+          <p:cNvPr id="9" name="Rettangolo 8">
+            <a:extLst>
+              <a:ext uri="{FF2B5EF4-FFF2-40B4-BE49-F238E27FC236}">
+                <a16:creationId xmlns:a16="http://schemas.microsoft.com/office/drawing/2014/main" id="{AAEED3E7-0A11-8478-3AE9-CC8D94B14B42}"/>
+              </a:ext>
+            </a:extLst>
+          </p:cNvPr>
+          <p:cNvSpPr/>
+          <p:nvPr/>
+        </p:nvSpPr>
+        <p:spPr>
+          <a:xfrm>
+            <a:off x="10058399" y="6021238"/>
+            <a:ext cx="1966824" cy="552092"/>
+          </a:xfrm>
+          <a:prstGeom prst="rect">
+            <a:avLst/>
+          </a:prstGeom>
+          <a:noFill/>
+          <a:ln>
+            <a:solidFill>
+              <a:schemeClr val="tx1"/>
+            </a:solidFill>
+          </a:ln>
+        </p:spPr>
+        <p:style>
+          <a:lnRef idx="2">
+            <a:schemeClr val="accent1">
+              <a:shade val="15000"/>
+            </a:schemeClr>
+          </a:lnRef>
+          <a:fillRef idx="1">
+            <a:schemeClr val="accent1"/>
+          </a:fillRef>
+          <a:effectRef idx="0">
+            <a:schemeClr val="accent1"/>
+          </a:effectRef>
+          <a:fontRef idx="minor">
+            <a:schemeClr val="lt1"/>
+          </a:fontRef>
+        </p:style>
+        <p:txBody>
+          <a:bodyPr rtlCol="0" anchor="ctr"/>
+          <a:lstStyle/>
+          <a:p>
+            <a:pPr algn="ctr"/>
+            <a:r>
+              <a:rPr lang="it-IT" dirty="0">
+                <a:solidFill>
+                  <a:schemeClr val="tx1"/>
+                </a:solidFill>
+              </a:rPr>
+              <a:t>OPZIONI</a:t>
+            </a:r>
+          </a:p>
+        </p:txBody>
+      </p:sp>
+      <p:sp>
+        <p:nvSpPr>
+          <p:cNvPr id="10" name="Rettangolo 9">
+            <a:extLst>
+              <a:ext uri="{FF2B5EF4-FFF2-40B4-BE49-F238E27FC236}">
+                <a16:creationId xmlns:a16="http://schemas.microsoft.com/office/drawing/2014/main" id="{E137C29F-2830-FB85-6027-A9DC6BDC009A}"/>
+              </a:ext>
+            </a:extLst>
+          </p:cNvPr>
+          <p:cNvSpPr/>
+          <p:nvPr/>
+        </p:nvSpPr>
+        <p:spPr>
+          <a:xfrm>
+            <a:off x="7919046" y="6021238"/>
+            <a:ext cx="1966824" cy="552092"/>
+          </a:xfrm>
+          <a:prstGeom prst="rect">
+            <a:avLst/>
+          </a:prstGeom>
+          <a:noFill/>
+          <a:ln>
+            <a:solidFill>
+              <a:schemeClr val="tx1"/>
+            </a:solidFill>
+          </a:ln>
+        </p:spPr>
+        <p:style>
+          <a:lnRef idx="2">
+            <a:schemeClr val="accent1">
+              <a:shade val="15000"/>
+            </a:schemeClr>
+          </a:lnRef>
+          <a:fillRef idx="1">
+            <a:schemeClr val="accent1"/>
+          </a:fillRef>
+          <a:effectRef idx="0">
+            <a:schemeClr val="accent1"/>
+          </a:effectRef>
+          <a:fontRef idx="minor">
+            <a:schemeClr val="lt1"/>
+          </a:fontRef>
+        </p:style>
+        <p:txBody>
+          <a:bodyPr rtlCol="0" anchor="ctr"/>
+          <a:lstStyle/>
+          <a:p>
+            <a:pPr algn="ctr"/>
+            <a:r>
+              <a:rPr lang="it-IT" dirty="0">
+                <a:solidFill>
+                  <a:schemeClr val="tx1"/>
+                </a:solidFill>
+              </a:rPr>
+              <a:t>HOME</a:t>
+            </a:r>
+          </a:p>
+        </p:txBody>
+      </p:sp>
+      <p:sp>
+        <p:nvSpPr>
+          <p:cNvPr id="11" name="Rettangolo 10">
+            <a:extLst>
+              <a:ext uri="{FF2B5EF4-FFF2-40B4-BE49-F238E27FC236}">
+                <a16:creationId xmlns:a16="http://schemas.microsoft.com/office/drawing/2014/main" id="{AE0C84A7-B28E-E35B-770D-6C196E30BF99}"/>
+              </a:ext>
+            </a:extLst>
+          </p:cNvPr>
+          <p:cNvSpPr/>
+          <p:nvPr/>
+        </p:nvSpPr>
+        <p:spPr>
+          <a:xfrm>
+            <a:off x="3554082" y="6021238"/>
+            <a:ext cx="1966824" cy="552092"/>
+          </a:xfrm>
+          <a:prstGeom prst="rect">
+            <a:avLst/>
+          </a:prstGeom>
+          <a:noFill/>
+          <a:ln>
+            <a:solidFill>
+              <a:schemeClr val="tx1"/>
+            </a:solidFill>
+          </a:ln>
+        </p:spPr>
+        <p:style>
+          <a:lnRef idx="2">
+            <a:schemeClr val="accent1">
+              <a:shade val="15000"/>
+            </a:schemeClr>
+          </a:lnRef>
+          <a:fillRef idx="1">
+            <a:schemeClr val="accent1"/>
+          </a:fillRef>
+          <a:effectRef idx="0">
+            <a:schemeClr val="accent1"/>
+          </a:effectRef>
+          <a:fontRef idx="minor">
+            <a:schemeClr val="lt1"/>
+          </a:fontRef>
+        </p:style>
+        <p:txBody>
+          <a:bodyPr rtlCol="0" anchor="ctr"/>
+          <a:lstStyle/>
+          <a:p>
+            <a:pPr algn="ctr"/>
+            <a:r>
+              <a:rPr lang="it-IT" dirty="0">
+                <a:solidFill>
+                  <a:schemeClr val="tx1"/>
+                </a:solidFill>
+              </a:rPr>
+              <a:t>PERSONAGGIO</a:t>
+            </a:r>
+          </a:p>
+        </p:txBody>
+      </p:sp>
+      <p:sp>
+        <p:nvSpPr>
+          <p:cNvPr id="12" name="Rettangolo 11">
+            <a:extLst>
+              <a:ext uri="{FF2B5EF4-FFF2-40B4-BE49-F238E27FC236}">
+                <a16:creationId xmlns:a16="http://schemas.microsoft.com/office/drawing/2014/main" id="{335092F2-2D03-4B2C-FFEE-5334AD54E8CC}"/>
+              </a:ext>
+            </a:extLst>
+          </p:cNvPr>
+          <p:cNvSpPr/>
+          <p:nvPr/>
+        </p:nvSpPr>
+        <p:spPr>
+          <a:xfrm>
+            <a:off x="5710685" y="6021238"/>
+            <a:ext cx="1966824" cy="552092"/>
+          </a:xfrm>
+          <a:prstGeom prst="rect">
+            <a:avLst/>
+          </a:prstGeom>
+          <a:noFill/>
+          <a:ln>
+            <a:solidFill>
+              <a:schemeClr val="tx1"/>
+            </a:solidFill>
+          </a:ln>
+        </p:spPr>
+        <p:style>
+          <a:lnRef idx="2">
+            <a:schemeClr val="accent1">
+              <a:shade val="15000"/>
+            </a:schemeClr>
+          </a:lnRef>
+          <a:fillRef idx="1">
+            <a:schemeClr val="accent1"/>
+          </a:fillRef>
+          <a:effectRef idx="0">
+            <a:schemeClr val="accent1"/>
+          </a:effectRef>
+          <a:fontRef idx="minor">
+            <a:schemeClr val="lt1"/>
+          </a:fontRef>
+        </p:style>
+        <p:txBody>
+          <a:bodyPr rtlCol="0" anchor="ctr"/>
+          <a:lstStyle/>
+          <a:p>
+            <a:pPr algn="ctr"/>
+            <a:r>
+              <a:rPr lang="it-IT" dirty="0">
+                <a:solidFill>
+                  <a:schemeClr val="tx1"/>
+                </a:solidFill>
+              </a:rPr>
+              <a:t>INFLUENZA</a:t>
+            </a:r>
+          </a:p>
+        </p:txBody>
+      </p:sp>
+      <p:sp>
+        <p:nvSpPr>
+          <p:cNvPr id="13" name="Rettangolo 12">
+            <a:extLst>
+              <a:ext uri="{FF2B5EF4-FFF2-40B4-BE49-F238E27FC236}">
+                <a16:creationId xmlns:a16="http://schemas.microsoft.com/office/drawing/2014/main" id="{0F17A28B-BA02-9047-2BA6-2051DB1459F2}"/>
+              </a:ext>
+            </a:extLst>
+          </p:cNvPr>
+          <p:cNvSpPr/>
+          <p:nvPr/>
+        </p:nvSpPr>
+        <p:spPr>
+          <a:xfrm>
+            <a:off x="241541" y="207034"/>
+            <a:ext cx="3122762" cy="426897"/>
+          </a:xfrm>
+          <a:prstGeom prst="rect">
+            <a:avLst/>
+          </a:prstGeom>
+        </p:spPr>
+        <p:style>
+          <a:lnRef idx="2">
+            <a:schemeClr val="accent2"/>
+          </a:lnRef>
+          <a:fillRef idx="1">
+            <a:schemeClr val="lt1"/>
+          </a:fillRef>
+          <a:effectRef idx="0">
+            <a:schemeClr val="accent2"/>
+          </a:effectRef>
+          <a:fontRef idx="minor">
+            <a:schemeClr val="dk1"/>
+          </a:fontRef>
+        </p:style>
+        <p:txBody>
+          <a:bodyPr rtlCol="0" anchor="ctr"/>
+          <a:lstStyle/>
+          <a:p>
+            <a:pPr algn="ctr"/>
+            <a:r>
+              <a:rPr lang="it-IT" dirty="0"/>
+              <a:t>TITOLO</a:t>
+            </a:r>
+          </a:p>
+        </p:txBody>
+      </p:sp>
+    </p:spTree>
+    <p:extLst>
+      <p:ext uri="{BB962C8B-B14F-4D97-AF65-F5344CB8AC3E}">
+        <p14:creationId xmlns:p14="http://schemas.microsoft.com/office/powerpoint/2010/main" val="1859182865"/>
       </p:ext>
     </p:extLst>
   </p:cSld>

</xml_diff>